<commit_message>
Mod 8: changed centos 6.7 to 6.9, regenerated PDFs
</commit_message>
<xml_diff>
--- a/08-refactoring_for_multiple_platforms.pptx
+++ b/08-refactoring_for_multiple_platforms.pptx
@@ -7508,14 +7508,14 @@
           </a:ln>
           <a:extLst>
             <a:ext uri="{909E8E84-426E-40dd-AFC4-6F175D3DCCD1}">
-              <a14:hiddenFill xmlns:a14="http://schemas.microsoft.com/office/drawing/2010/main" xmlns="">
+              <a14:hiddenFill xmlns="" xmlns:a14="http://schemas.microsoft.com/office/drawing/2010/main">
                 <a:solidFill>
                   <a:srgbClr val="FFFFFF"/>
                 </a:solidFill>
               </a14:hiddenFill>
             </a:ext>
             <a:ext uri="{91240B29-F687-4f45-9708-019B960494DF}">
-              <a14:hiddenLine xmlns:a14="http://schemas.microsoft.com/office/drawing/2010/main" xmlns="" w="9525">
+              <a14:hiddenLine xmlns="" xmlns:a14="http://schemas.microsoft.com/office/drawing/2010/main" w="9525">
                 <a:solidFill>
                   <a:srgbClr val="000000"/>
                 </a:solidFill>
@@ -7663,14 +7663,14 @@
           </a:ln>
           <a:extLst>
             <a:ext uri="{909E8E84-426E-40dd-AFC4-6F175D3DCCD1}">
-              <a14:hiddenFill xmlns:a14="http://schemas.microsoft.com/office/drawing/2010/main" xmlns="">
+              <a14:hiddenFill xmlns="" xmlns:a14="http://schemas.microsoft.com/office/drawing/2010/main">
                 <a:solidFill>
                   <a:srgbClr val="FFFFFF"/>
                 </a:solidFill>
               </a14:hiddenFill>
             </a:ext>
             <a:ext uri="{91240B29-F687-4f45-9708-019B960494DF}">
-              <a14:hiddenLine xmlns:a14="http://schemas.microsoft.com/office/drawing/2010/main" xmlns="" w="9525">
+              <a14:hiddenLine xmlns="" xmlns:a14="http://schemas.microsoft.com/office/drawing/2010/main" w="9525">
                 <a:solidFill>
                   <a:srgbClr val="000000"/>
                 </a:solidFill>
@@ -8161,14 +8161,14 @@
           </a:ln>
           <a:extLst>
             <a:ext uri="{909E8E84-426E-40dd-AFC4-6F175D3DCCD1}">
-              <a14:hiddenFill xmlns:a14="http://schemas.microsoft.com/office/drawing/2010/main" xmlns="">
+              <a14:hiddenFill xmlns="" xmlns:a14="http://schemas.microsoft.com/office/drawing/2010/main">
                 <a:solidFill>
                   <a:srgbClr val="FFFFFF"/>
                 </a:solidFill>
               </a14:hiddenFill>
             </a:ext>
             <a:ext uri="{91240B29-F687-4f45-9708-019B960494DF}">
-              <a14:hiddenLine xmlns:a14="http://schemas.microsoft.com/office/drawing/2010/main" xmlns="" w="9525">
+              <a14:hiddenLine xmlns="" xmlns:a14="http://schemas.microsoft.com/office/drawing/2010/main" w="9525">
                 <a:solidFill>
                   <a:srgbClr val="000000"/>
                 </a:solidFill>
@@ -8406,14 +8406,14 @@
           </a:ln>
           <a:extLst>
             <a:ext uri="{909E8E84-426E-40dd-AFC4-6F175D3DCCD1}">
-              <a14:hiddenFill xmlns:a14="http://schemas.microsoft.com/office/drawing/2010/main" xmlns="">
+              <a14:hiddenFill xmlns="" xmlns:a14="http://schemas.microsoft.com/office/drawing/2010/main">
                 <a:solidFill>
                   <a:srgbClr val="FFFFFF"/>
                 </a:solidFill>
               </a14:hiddenFill>
             </a:ext>
             <a:ext uri="{91240B29-F687-4f45-9708-019B960494DF}">
-              <a14:hiddenLine xmlns:a14="http://schemas.microsoft.com/office/drawing/2010/main" xmlns="" w="9525">
+              <a14:hiddenLine xmlns="" xmlns:a14="http://schemas.microsoft.com/office/drawing/2010/main" w="9525">
                 <a:solidFill>
                   <a:srgbClr val="000000"/>
                 </a:solidFill>
@@ -10302,14 +10302,14 @@
           </a:ln>
           <a:extLst>
             <a:ext uri="{909E8E84-426E-40dd-AFC4-6F175D3DCCD1}">
-              <a14:hiddenFill xmlns:a14="http://schemas.microsoft.com/office/drawing/2010/main" xmlns="">
+              <a14:hiddenFill xmlns="" xmlns:a14="http://schemas.microsoft.com/office/drawing/2010/main">
                 <a:solidFill>
                   <a:srgbClr val="FFFFFF"/>
                 </a:solidFill>
               </a14:hiddenFill>
             </a:ext>
             <a:ext uri="{91240B29-F687-4f45-9708-019B960494DF}">
-              <a14:hiddenLine xmlns:a14="http://schemas.microsoft.com/office/drawing/2010/main" xmlns="" w="9525">
+              <a14:hiddenLine xmlns="" xmlns:a14="http://schemas.microsoft.com/office/drawing/2010/main" w="9525">
                 <a:solidFill>
                   <a:srgbClr val="000000"/>
                 </a:solidFill>
@@ -11643,14 +11643,14 @@
           </a:ln>
           <a:extLst>
             <a:ext uri="{909E8E84-426E-40dd-AFC4-6F175D3DCCD1}">
-              <a14:hiddenFill xmlns:a14="http://schemas.microsoft.com/office/drawing/2010/main" xmlns="">
+              <a14:hiddenFill xmlns="" xmlns:a14="http://schemas.microsoft.com/office/drawing/2010/main">
                 <a:solidFill>
                   <a:srgbClr val="FFFFFF"/>
                 </a:solidFill>
               </a14:hiddenFill>
             </a:ext>
             <a:ext uri="{91240B29-F687-4f45-9708-019B960494DF}">
-              <a14:hiddenLine xmlns:a14="http://schemas.microsoft.com/office/drawing/2010/main" xmlns="" w="9525">
+              <a14:hiddenLine xmlns="" xmlns:a14="http://schemas.microsoft.com/office/drawing/2010/main" w="9525">
                 <a:solidFill>
                   <a:srgbClr val="000000"/>
                 </a:solidFill>
@@ -12208,14 +12208,14 @@
           </a:ln>
           <a:extLst>
             <a:ext uri="{909E8E84-426E-40dd-AFC4-6F175D3DCCD1}">
-              <a14:hiddenFill xmlns:a14="http://schemas.microsoft.com/office/drawing/2010/main" xmlns="">
+              <a14:hiddenFill xmlns="" xmlns:a14="http://schemas.microsoft.com/office/drawing/2010/main">
                 <a:solidFill>
                   <a:srgbClr val="FFFFFF"/>
                 </a:solidFill>
               </a14:hiddenFill>
             </a:ext>
             <a:ext uri="{91240B29-F687-4f45-9708-019B960494DF}">
-              <a14:hiddenLine xmlns:a14="http://schemas.microsoft.com/office/drawing/2010/main" xmlns="" w="9525">
+              <a14:hiddenLine xmlns="" xmlns:a14="http://schemas.microsoft.com/office/drawing/2010/main" w="9525">
                 <a:solidFill>
                   <a:srgbClr val="000000"/>
                 </a:solidFill>
@@ -12782,14 +12782,14 @@
           </a:ln>
           <a:extLst>
             <a:ext uri="{909E8E84-426E-40dd-AFC4-6F175D3DCCD1}">
-              <a14:hiddenFill xmlns:a14="http://schemas.microsoft.com/office/drawing/2010/main" xmlns="">
+              <a14:hiddenFill xmlns="" xmlns:a14="http://schemas.microsoft.com/office/drawing/2010/main">
                 <a:solidFill>
                   <a:srgbClr val="FFFFFF"/>
                 </a:solidFill>
               </a14:hiddenFill>
             </a:ext>
             <a:ext uri="{91240B29-F687-4f45-9708-019B960494DF}">
-              <a14:hiddenLine xmlns:a14="http://schemas.microsoft.com/office/drawing/2010/main" xmlns="" w="9525">
+              <a14:hiddenLine xmlns="" xmlns:a14="http://schemas.microsoft.com/office/drawing/2010/main" w="9525">
                 <a:solidFill>
                   <a:srgbClr val="000000"/>
                 </a:solidFill>
@@ -13729,14 +13729,14 @@
           </a:ln>
           <a:extLst>
             <a:ext uri="{909E8E84-426E-40dd-AFC4-6F175D3DCCD1}">
-              <a14:hiddenFill xmlns:a14="http://schemas.microsoft.com/office/drawing/2010/main" xmlns="">
+              <a14:hiddenFill xmlns="" xmlns:a14="http://schemas.microsoft.com/office/drawing/2010/main">
                 <a:solidFill>
                   <a:srgbClr val="FFFFFF"/>
                 </a:solidFill>
               </a14:hiddenFill>
             </a:ext>
             <a:ext uri="{91240B29-F687-4f45-9708-019B960494DF}">
-              <a14:hiddenLine xmlns:a14="http://schemas.microsoft.com/office/drawing/2010/main" xmlns="" w="9525">
+              <a14:hiddenLine xmlns="" xmlns:a14="http://schemas.microsoft.com/office/drawing/2010/main" w="9525">
                 <a:solidFill>
                   <a:srgbClr val="000000"/>
                 </a:solidFill>
@@ -14493,14 +14493,14 @@
           </a:ln>
           <a:extLst>
             <a:ext uri="{909E8E84-426E-40dd-AFC4-6F175D3DCCD1}">
-              <a14:hiddenFill xmlns:a14="http://schemas.microsoft.com/office/drawing/2010/main" xmlns="">
+              <a14:hiddenFill xmlns="" xmlns:a14="http://schemas.microsoft.com/office/drawing/2010/main">
                 <a:solidFill>
                   <a:srgbClr val="FFFFFF"/>
                 </a:solidFill>
               </a14:hiddenFill>
             </a:ext>
             <a:ext uri="{91240B29-F687-4f45-9708-019B960494DF}">
-              <a14:hiddenLine xmlns:a14="http://schemas.microsoft.com/office/drawing/2010/main" xmlns="" w="9525">
+              <a14:hiddenLine xmlns="" xmlns:a14="http://schemas.microsoft.com/office/drawing/2010/main" w="9525">
                 <a:solidFill>
                   <a:srgbClr val="000000"/>
                 </a:solidFill>
@@ -23437,21 +23437,13 @@
           <a:p>
             <a:r>
               <a:rPr lang="en-US" sz="2400" dirty="0"/>
-              <a:t>Instance             Driver  </a:t>
-            </a:r>
-            <a:r>
-              <a:rPr lang="en-US" sz="2400" dirty="0" err="1"/>
-              <a:t>Provisioner</a:t>
-            </a:r>
+              <a:t>Instance             Driver  Provisioner  Verifier  Transport  Last Action</a:t>
+            </a:r>
+          </a:p>
+          <a:p>
             <a:r>
               <a:rPr lang="en-US" sz="2400" dirty="0"/>
-              <a:t>  Verifier  Transport  Last Action</a:t>
-            </a:r>
-          </a:p>
-          <a:p>
-            <a:r>
-              <a:rPr lang="en-US" sz="2400" dirty="0"/>
-              <a:t>default-centos-67    Docker  </a:t>
+              <a:t>default-centos-69    Docker  </a:t>
             </a:r>
             <a:r>
               <a:rPr lang="en-US" sz="2400" dirty="0" err="1"/>
@@ -23481,15 +23473,7 @@
           <a:p>
             <a:r>
               <a:rPr lang="en-US" sz="2400" dirty="0"/>
-              <a:t>default-ubuntu-1404  </a:t>
-            </a:r>
-            <a:r>
-              <a:rPr lang="en-US" sz="2400" dirty="0" err="1"/>
-              <a:t>Docker</a:t>
-            </a:r>
-            <a:r>
-              <a:rPr lang="en-US" sz="2400" dirty="0"/>
-              <a:t>  </a:t>
+              <a:t>default-ubuntu-1404  Docker  </a:t>
             </a:r>
             <a:r>
               <a:rPr lang="en-US" sz="2400" dirty="0" err="1"/>
@@ -23746,37 +23730,37 @@
           <a:p>
             <a:r>
               <a:rPr lang="en-US" dirty="0"/>
-              <a:t>-----&gt; Starting Kitchen (v1.11.1)</a:t>
-            </a:r>
-          </a:p>
-          <a:p>
-            <a:r>
-              <a:rPr lang="en-US" dirty="0"/>
-              <a:t>-----&gt; Cleaning up any prior instances of &lt;default-centos-67&gt;</a:t>
-            </a:r>
-          </a:p>
-          <a:p>
-            <a:r>
-              <a:rPr lang="en-US" dirty="0"/>
-              <a:t>-----&gt; Destroying &lt;default-centos-67&gt;...</a:t>
-            </a:r>
-          </a:p>
-          <a:p>
-            <a:r>
-              <a:rPr lang="en-US" dirty="0"/>
-              <a:t>       Finished destroying &lt;default-centos-67&gt; (0m0.00s).</a:t>
-            </a:r>
-          </a:p>
-          <a:p>
-            <a:r>
-              <a:rPr lang="en-US" dirty="0"/>
-              <a:t>-----&gt; Testing &lt;default-centos-67&gt;</a:t>
-            </a:r>
-          </a:p>
-          <a:p>
-            <a:r>
-              <a:rPr lang="en-US" dirty="0"/>
-              <a:t>-----&gt; Creating &lt;default-centos-67&gt;</a:t>
+              <a:t>-----&gt; Starting Kitchen (v1.19.1)</a:t>
+            </a:r>
+          </a:p>
+          <a:p>
+            <a:r>
+              <a:rPr lang="en-US" dirty="0"/>
+              <a:t>-----&gt; Cleaning up any prior instances of &lt;default-centos-69&gt;</a:t>
+            </a:r>
+          </a:p>
+          <a:p>
+            <a:r>
+              <a:rPr lang="en-US" dirty="0"/>
+              <a:t>-----&gt; Destroying &lt;default-centos-69&gt;...</a:t>
+            </a:r>
+          </a:p>
+          <a:p>
+            <a:r>
+              <a:rPr lang="en-US" dirty="0"/>
+              <a:t>       Finished destroying &lt;default-centos-69&gt; (0m0.00s).</a:t>
+            </a:r>
+          </a:p>
+          <a:p>
+            <a:r>
+              <a:rPr lang="en-US" dirty="0"/>
+              <a:t>-----&gt; Testing &lt;default-centos-69&gt;</a:t>
+            </a:r>
+          </a:p>
+          <a:p>
+            <a:r>
+              <a:rPr lang="en-US" dirty="0"/>
+              <a:t>-----&gt; Creating &lt;default-centos-69&gt;</a:t>
             </a:r>
           </a:p>
           <a:p>
@@ -26940,15 +26924,6 @@
 
 <file path=customXml/item1.xml><?xml version="1.0" encoding="utf-8"?>
 <?mso-contentType ?>
-<FormTemplates xmlns="http://schemas.microsoft.com/sharepoint/v3/contenttype/forms">
-  <Display>DocumentLibraryForm</Display>
-  <Edit>DocumentLibraryForm</Edit>
-  <New>DocumentLibraryForm</New>
-</FormTemplates>
-</file>
-
-<file path=customXml/item2.xml><?xml version="1.0" encoding="utf-8"?>
-<?mso-contentType ?>
 <spe:Receivers xmlns:spe="http://schemas.microsoft.com/sharepoint/events">
   <Receiver>
     <Name>Document ID Generator</Name>
@@ -26993,7 +26968,28 @@
 </spe:Receivers>
 </file>
 
+<file path=customXml/item2.xml><?xml version="1.0" encoding="utf-8"?>
+<?mso-contentType ?>
+<FormTemplates xmlns="http://schemas.microsoft.com/sharepoint/v3/contenttype/forms">
+  <Display>DocumentLibraryForm</Display>
+  <Edit>DocumentLibraryForm</Edit>
+  <New>DocumentLibraryForm</New>
+</FormTemplates>
+</file>
+
 <file path=customXml/item3.xml><?xml version="1.0" encoding="utf-8"?>
+<p:properties xmlns:p="http://schemas.microsoft.com/office/2006/metadata/properties" xmlns:xsi="http://www.w3.org/2001/XMLSchema-instance" xmlns:pc="http://schemas.microsoft.com/office/infopath/2007/PartnerControls">
+  <documentManagement>
+    <_dlc_DocId xmlns="7bb5d761-a2ea-4873-95f7-7a6658fb3ef0">M4CWTKMW727E-592-73</_dlc_DocId>
+    <_dlc_DocIdUrl xmlns="7bb5d761-a2ea-4873-95f7-7a6658fb3ef0">
+      <Url>https://kms.vci.local/marketing/team/_layouts/DocIdRedir.aspx?ID=M4CWTKMW727E-592-73</Url>
+      <Description>M4CWTKMW727E-592-73</Description>
+    </_dlc_DocIdUrl>
+  </documentManagement>
+</p:properties>
+</file>
+
+<file path=customXml/item4.xml><?xml version="1.0" encoding="utf-8"?>
 <ct:contentTypeSchema xmlns:ct="http://schemas.microsoft.com/office/2006/metadata/contentType" xmlns:ma="http://schemas.microsoft.com/office/2006/metadata/properties/metaAttributes" ct:_="" ma:_="" ma:contentTypeName="Document" ma:contentTypeID="0x0101000812F700BE7F874999720E88173FE491" ma:contentTypeVersion="0" ma:contentTypeDescription="Create a new document." ma:contentTypeScope="" ma:versionID="3f79f408e2ca720b7aba6e0e32464d0c">
   <xsd:schema xmlns:xsd="http://www.w3.org/2001/XMLSchema" xmlns:xs="http://www.w3.org/2001/XMLSchema" xmlns:p="http://schemas.microsoft.com/office/2006/metadata/properties" xmlns:ns2="7bb5d761-a2ea-4873-95f7-7a6658fb3ef0" targetNamespace="http://schemas.microsoft.com/office/2006/metadata/properties" ma:root="true" ma:fieldsID="1e062cd38ba31e406bfc4340fbc7f87a" ns2:_="">
     <xsd:import namespace="7bb5d761-a2ea-4873-95f7-7a6658fb3ef0"/>
@@ -27138,19 +27134,15 @@
 </ct:contentTypeSchema>
 </file>
 
-<file path=customXml/item4.xml><?xml version="1.0" encoding="utf-8"?>
-<p:properties xmlns:p="http://schemas.microsoft.com/office/2006/metadata/properties" xmlns:xsi="http://www.w3.org/2001/XMLSchema-instance" xmlns:pc="http://schemas.microsoft.com/office/infopath/2007/PartnerControls">
-  <documentManagement>
-    <_dlc_DocId xmlns="7bb5d761-a2ea-4873-95f7-7a6658fb3ef0">M4CWTKMW727E-592-73</_dlc_DocId>
-    <_dlc_DocIdUrl xmlns="7bb5d761-a2ea-4873-95f7-7a6658fb3ef0">
-      <Url>https://kms.vci.local/marketing/team/_layouts/DocIdRedir.aspx?ID=M4CWTKMW727E-592-73</Url>
-      <Description>M4CWTKMW727E-592-73</Description>
-    </_dlc_DocIdUrl>
-  </documentManagement>
-</p:properties>
+<file path=customXml/itemProps1.xml><?xml version="1.0" encoding="utf-8"?>
+<ds:datastoreItem xmlns:ds="http://schemas.openxmlformats.org/officeDocument/2006/customXml" ds:itemID="{B13EBC30-FE27-4C6A-B723-23FC2188F7DC}">
+  <ds:schemaRefs>
+    <ds:schemaRef ds:uri="http://schemas.microsoft.com/sharepoint/events"/>
+  </ds:schemaRefs>
+</ds:datastoreItem>
 </file>
 
-<file path=customXml/itemProps1.xml><?xml version="1.0" encoding="utf-8"?>
+<file path=customXml/itemProps2.xml><?xml version="1.0" encoding="utf-8"?>
 <ds:datastoreItem xmlns:ds="http://schemas.openxmlformats.org/officeDocument/2006/customXml" ds:itemID="{5CDEB364-43EC-4510-9881-539C2A3FCE9E}">
   <ds:schemaRefs>
     <ds:schemaRef ds:uri="http://schemas.microsoft.com/sharepoint/v3/contenttype/forms"/>
@@ -27158,15 +27150,23 @@
 </ds:datastoreItem>
 </file>
 
-<file path=customXml/itemProps2.xml><?xml version="1.0" encoding="utf-8"?>
-<ds:datastoreItem xmlns:ds="http://schemas.openxmlformats.org/officeDocument/2006/customXml" ds:itemID="{B13EBC30-FE27-4C6A-B723-23FC2188F7DC}">
+<file path=customXml/itemProps3.xml><?xml version="1.0" encoding="utf-8"?>
+<ds:datastoreItem xmlns:ds="http://schemas.openxmlformats.org/officeDocument/2006/customXml" ds:itemID="{6921749B-AEB7-461B-845F-603CABD25259}">
   <ds:schemaRefs>
-    <ds:schemaRef ds:uri="http://schemas.microsoft.com/sharepoint/events"/>
+    <ds:schemaRef ds:uri="7bb5d761-a2ea-4873-95f7-7a6658fb3ef0"/>
+    <ds:schemaRef ds:uri="http://purl.org/dc/terms/"/>
+    <ds:schemaRef ds:uri="http://schemas.openxmlformats.org/package/2006/metadata/core-properties"/>
+    <ds:schemaRef ds:uri="http://purl.org/dc/dcmitype/"/>
+    <ds:schemaRef ds:uri="http://schemas.microsoft.com/office/2006/documentManagement/types"/>
+    <ds:schemaRef ds:uri="http://purl.org/dc/elements/1.1/"/>
+    <ds:schemaRef ds:uri="http://schemas.microsoft.com/office/2006/metadata/properties"/>
+    <ds:schemaRef ds:uri="http://schemas.microsoft.com/office/infopath/2007/PartnerControls"/>
+    <ds:schemaRef ds:uri="http://www.w3.org/XML/1998/namespace"/>
   </ds:schemaRefs>
 </ds:datastoreItem>
 </file>
 
-<file path=customXml/itemProps3.xml><?xml version="1.0" encoding="utf-8"?>
+<file path=customXml/itemProps4.xml><?xml version="1.0" encoding="utf-8"?>
 <ds:datastoreItem xmlns:ds="http://schemas.openxmlformats.org/officeDocument/2006/customXml" ds:itemID="{164479E5-0B02-49AC-B79E-EC1D6164DDD3}">
   <ds:schemaRefs>
     <ds:schemaRef ds:uri="http://schemas.microsoft.com/office/2006/metadata/contentType"/>
@@ -27182,20 +27182,4 @@
     <ds:schemaRef ds:uri="http://schemas.microsoft.com/internal/obd"/>
   </ds:schemaRefs>
 </ds:datastoreItem>
-</file>
-
-<file path=customXml/itemProps4.xml><?xml version="1.0" encoding="utf-8"?>
-<ds:datastoreItem xmlns:ds="http://schemas.openxmlformats.org/officeDocument/2006/customXml" ds:itemID="{6921749B-AEB7-461B-845F-603CABD25259}">
-  <ds:schemaRefs>
-    <ds:schemaRef ds:uri="7bb5d761-a2ea-4873-95f7-7a6658fb3ef0"/>
-    <ds:schemaRef ds:uri="http://purl.org/dc/terms/"/>
-    <ds:schemaRef ds:uri="http://schemas.openxmlformats.org/package/2006/metadata/core-properties"/>
-    <ds:schemaRef ds:uri="http://purl.org/dc/dcmitype/"/>
-    <ds:schemaRef ds:uri="http://schemas.microsoft.com/office/2006/documentManagement/types"/>
-    <ds:schemaRef ds:uri="http://purl.org/dc/elements/1.1/"/>
-    <ds:schemaRef ds:uri="http://schemas.microsoft.com/office/2006/metadata/properties"/>
-    <ds:schemaRef ds:uri="http://schemas.microsoft.com/office/infopath/2007/PartnerControls"/>
-    <ds:schemaRef ds:uri="http://www.w3.org/XML/1998/namespace"/>
-  </ds:schemaRefs>
-</ds:datastoreItem>
 </file>
</xml_diff>